<commit_message>
Final DS Report and Presentation
</commit_message>
<xml_diff>
--- a/GAME OF CODES.pptx
+++ b/GAME OF CODES.pptx
@@ -115,7 +115,7 @@
   </p:defaultTextStyle>
   <p:extLst>
     <p:ext uri="{EFAFB233-063F-42B5-8137-9DF3F51BA10A}">
-      <p15:sldGuideLst xmlns:p15="http://schemas.microsoft.com/office/powerpoint/2012/main"/>
+      <p15:sldGuideLst xmlns="" xmlns:p15="http://schemas.microsoft.com/office/powerpoint/2012/main"/>
     </p:ext>
   </p:extLst>
 </p:presentation>
@@ -1279,6 +1279,13 @@
         </dgm:presLayoutVars>
       </dgm:prSet>
       <dgm:spPr/>
+      <dgm:t>
+        <a:bodyPr/>
+        <a:lstStyle/>
+        <a:p>
+          <a:endParaRPr lang="en-US"/>
+        </a:p>
+      </dgm:t>
     </dgm:pt>
     <dgm:pt modelId="{815EDF7B-AC93-4A61-87AA-CAA5D85C31A8}" type="pres">
       <dgm:prSet presAssocID="{8DB5D7D5-6A1C-4ABC-8850-759A9D876047}" presName="composite1" presStyleCnt="0"/>
@@ -1293,6 +1300,13 @@
         </dgm:presLayoutVars>
       </dgm:prSet>
       <dgm:spPr/>
+      <dgm:t>
+        <a:bodyPr/>
+        <a:lstStyle/>
+        <a:p>
+          <a:endParaRPr lang="en-US"/>
+        </a:p>
+      </dgm:t>
     </dgm:pt>
     <dgm:pt modelId="{5A1B764B-0DC5-47CD-BDEA-9E67799496EC}" type="pres">
       <dgm:prSet presAssocID="{8DB5D7D5-6A1C-4ABC-8850-759A9D876047}" presName="Childtext1" presStyleLbl="revTx" presStyleIdx="0" presStyleCnt="3">
@@ -1301,6 +1315,13 @@
         </dgm:presLayoutVars>
       </dgm:prSet>
       <dgm:spPr/>
+      <dgm:t>
+        <a:bodyPr/>
+        <a:lstStyle/>
+        <a:p>
+          <a:endParaRPr lang="en-US"/>
+        </a:p>
+      </dgm:t>
     </dgm:pt>
     <dgm:pt modelId="{122B38A3-0442-4747-820C-1F37877E2B0E}" type="pres">
       <dgm:prSet presAssocID="{8DB5D7D5-6A1C-4ABC-8850-759A9D876047}" presName="ConnectLine1" presStyleLbl="sibTrans1D1" presStyleIdx="0" presStyleCnt="3"/>
@@ -1345,6 +1366,13 @@
         </dgm:presLayoutVars>
       </dgm:prSet>
       <dgm:spPr/>
+      <dgm:t>
+        <a:bodyPr/>
+        <a:lstStyle/>
+        <a:p>
+          <a:endParaRPr lang="en-US"/>
+        </a:p>
+      </dgm:t>
     </dgm:pt>
     <dgm:pt modelId="{DF65791B-462E-4589-B98D-F60587330CA8}" type="pres">
       <dgm:prSet presAssocID="{C5146535-FD3D-4589-98A3-623B8DA4B8DB}" presName="Childtext1" presStyleLbl="revTx" presStyleIdx="1" presStyleCnt="3">
@@ -1353,6 +1381,13 @@
         </dgm:presLayoutVars>
       </dgm:prSet>
       <dgm:spPr/>
+      <dgm:t>
+        <a:bodyPr/>
+        <a:lstStyle/>
+        <a:p>
+          <a:endParaRPr lang="en-US"/>
+        </a:p>
+      </dgm:t>
     </dgm:pt>
     <dgm:pt modelId="{DBA410EB-5F61-4F46-92D9-C5B0AA59EE15}" type="pres">
       <dgm:prSet presAssocID="{C5146535-FD3D-4589-98A3-623B8DA4B8DB}" presName="ConnectLine1" presStyleLbl="sibTrans1D1" presStyleIdx="1" presStyleCnt="3"/>
@@ -1397,6 +1432,13 @@
         </dgm:presLayoutVars>
       </dgm:prSet>
       <dgm:spPr/>
+      <dgm:t>
+        <a:bodyPr/>
+        <a:lstStyle/>
+        <a:p>
+          <a:endParaRPr lang="en-US"/>
+        </a:p>
+      </dgm:t>
     </dgm:pt>
     <dgm:pt modelId="{B4723E2A-4FF1-452A-BD25-8EC364F15A6F}" type="pres">
       <dgm:prSet presAssocID="{09C152DA-7620-4852-8162-A77EC3609F3F}" presName="Childtext1" presStyleLbl="revTx" presStyleIdx="2" presStyleCnt="3">
@@ -1405,6 +1447,13 @@
         </dgm:presLayoutVars>
       </dgm:prSet>
       <dgm:spPr/>
+      <dgm:t>
+        <a:bodyPr/>
+        <a:lstStyle/>
+        <a:p>
+          <a:endParaRPr lang="en-US"/>
+        </a:p>
+      </dgm:t>
     </dgm:pt>
     <dgm:pt modelId="{440E9361-37D2-4157-AF38-7B49AD23708B}" type="pres">
       <dgm:prSet presAssocID="{09C152DA-7620-4852-8162-A77EC3609F3F}" presName="ConnectLine1" presStyleLbl="sibTrans1D1" presStyleIdx="2" presStyleCnt="3"/>
@@ -1434,19 +1483,19 @@
     </dgm:pt>
   </dgm:ptLst>
   <dgm:cxnLst>
+    <dgm:cxn modelId="{8EBF857E-7408-4941-91E4-293B0F59EEF7}" srcId="{6A70FD8F-0050-42E3-8B3A-6ED7CFB9852E}" destId="{C5146535-FD3D-4589-98A3-623B8DA4B8DB}" srcOrd="1" destOrd="0" parTransId="{20848F78-EC70-4162-96CE-CC68006930F0}" sibTransId="{7A3CCAF8-AC3A-401E-AEDD-44BBC1AA9C31}"/>
+    <dgm:cxn modelId="{F9B2D375-40BE-4E5D-AA88-61805FBFF819}" type="presOf" srcId="{8DB5D7D5-6A1C-4ABC-8850-759A9D876047}" destId="{954381E7-0584-46DD-8108-E9BF4F2B5005}" srcOrd="0" destOrd="0" presId="urn:microsoft.com/office/officeart/2016/7/layout/RoundedRectangleTimeline"/>
+    <dgm:cxn modelId="{C5202EE1-10E9-4076-9D55-9E0CF8B152AF}" srcId="{6A70FD8F-0050-42E3-8B3A-6ED7CFB9852E}" destId="{8DB5D7D5-6A1C-4ABC-8850-759A9D876047}" srcOrd="0" destOrd="0" parTransId="{D8874F40-D7B0-41DE-BB6F-A6014FEAB2D7}" sibTransId="{BD6E0A2E-99C8-4F5A-971A-CD211D1099FF}"/>
+    <dgm:cxn modelId="{E2BBA750-A5E4-4F50-BE16-016934379F81}" type="presOf" srcId="{6C8937BE-93F8-4DED-8538-1C601DAEBA66}" destId="{B4723E2A-4FF1-452A-BD25-8EC364F15A6F}" srcOrd="0" destOrd="0" presId="urn:microsoft.com/office/officeart/2016/7/layout/RoundedRectangleTimeline"/>
+    <dgm:cxn modelId="{FAA8D3DD-12E8-457D-9144-B037C5678347}" srcId="{09C152DA-7620-4852-8162-A77EC3609F3F}" destId="{6C8937BE-93F8-4DED-8538-1C601DAEBA66}" srcOrd="0" destOrd="0" parTransId="{77D169C6-D77F-456D-B18B-D7BE016AD87A}" sibTransId="{A97BE953-FA9D-4BA6-A92C-494DB1F3BA59}"/>
+    <dgm:cxn modelId="{E13585A2-54F2-486A-B317-F4D6AF7E83B9}" type="presOf" srcId="{E80CA270-6C90-4E17-ACEA-46B56AD54DD1}" destId="{DF65791B-462E-4589-B98D-F60587330CA8}" srcOrd="0" destOrd="0" presId="urn:microsoft.com/office/officeart/2016/7/layout/RoundedRectangleTimeline"/>
     <dgm:cxn modelId="{5C25BB02-FA66-40A4-9DA6-9E1CAE3A8D4E}" type="presOf" srcId="{C5146535-FD3D-4589-98A3-623B8DA4B8DB}" destId="{30804A27-188E-4A17-8FFE-97BCCA0597B8}" srcOrd="0" destOrd="0" presId="urn:microsoft.com/office/officeart/2016/7/layout/RoundedRectangleTimeline"/>
+    <dgm:cxn modelId="{23ECAC8B-17A4-4883-AA0E-06D66B7E788A}" srcId="{6A70FD8F-0050-42E3-8B3A-6ED7CFB9852E}" destId="{09C152DA-7620-4852-8162-A77EC3609F3F}" srcOrd="2" destOrd="0" parTransId="{9F6D14C0-6C82-4CBD-8D6D-B0E117B6F2ED}" sibTransId="{0AE8D36D-0F0F-4206-AE39-0A2D73987B68}"/>
+    <dgm:cxn modelId="{84C67813-55CE-4EBC-9032-03BD847DC17E}" type="presOf" srcId="{6A70FD8F-0050-42E3-8B3A-6ED7CFB9852E}" destId="{AB52B3CC-6563-466D-BFC3-9B6B5AFA0881}" srcOrd="0" destOrd="0" presId="urn:microsoft.com/office/officeart/2016/7/layout/RoundedRectangleTimeline"/>
+    <dgm:cxn modelId="{F9540599-A193-456C-A9A9-8962E3855B0B}" type="presOf" srcId="{96262926-A67D-4E4E-9515-5EBC67F0B634}" destId="{5A1B764B-0DC5-47CD-BDEA-9E67799496EC}" srcOrd="0" destOrd="0" presId="urn:microsoft.com/office/officeart/2016/7/layout/RoundedRectangleTimeline"/>
     <dgm:cxn modelId="{8C5B110A-FBC3-4CBF-BED2-413E87D4DAD5}" srcId="{8DB5D7D5-6A1C-4ABC-8850-759A9D876047}" destId="{96262926-A67D-4E4E-9515-5EBC67F0B634}" srcOrd="0" destOrd="0" parTransId="{EC74E552-C501-4B0E-9400-E8B410F53D50}" sibTransId="{1DA7ACEB-F642-43C1-BCB5-F580B9B985B9}"/>
-    <dgm:cxn modelId="{84C67813-55CE-4EBC-9032-03BD847DC17E}" type="presOf" srcId="{6A70FD8F-0050-42E3-8B3A-6ED7CFB9852E}" destId="{AB52B3CC-6563-466D-BFC3-9B6B5AFA0881}" srcOrd="0" destOrd="0" presId="urn:microsoft.com/office/officeart/2016/7/layout/RoundedRectangleTimeline"/>
+    <dgm:cxn modelId="{2DC28DF8-5C1B-4F53-A4C1-D5B63FB54BAF}" srcId="{C5146535-FD3D-4589-98A3-623B8DA4B8DB}" destId="{E80CA270-6C90-4E17-ACEA-46B56AD54DD1}" srcOrd="0" destOrd="0" parTransId="{7EEC8067-96EF-4BE0-8BE3-BA59ED78A31F}" sibTransId="{1AFE46E5-6B07-4894-8ECB-21BD7E7B8AF1}"/>
     <dgm:cxn modelId="{22ECA226-C4EA-44F1-BCB5-77F78841DA6F}" type="presOf" srcId="{09C152DA-7620-4852-8162-A77EC3609F3F}" destId="{566B79CB-1A41-4F5C-BF91-58D94BF93913}" srcOrd="0" destOrd="0" presId="urn:microsoft.com/office/officeart/2016/7/layout/RoundedRectangleTimeline"/>
-    <dgm:cxn modelId="{E2BBA750-A5E4-4F50-BE16-016934379F81}" type="presOf" srcId="{6C8937BE-93F8-4DED-8538-1C601DAEBA66}" destId="{B4723E2A-4FF1-452A-BD25-8EC364F15A6F}" srcOrd="0" destOrd="0" presId="urn:microsoft.com/office/officeart/2016/7/layout/RoundedRectangleTimeline"/>
-    <dgm:cxn modelId="{F9B2D375-40BE-4E5D-AA88-61805FBFF819}" type="presOf" srcId="{8DB5D7D5-6A1C-4ABC-8850-759A9D876047}" destId="{954381E7-0584-46DD-8108-E9BF4F2B5005}" srcOrd="0" destOrd="0" presId="urn:microsoft.com/office/officeart/2016/7/layout/RoundedRectangleTimeline"/>
-    <dgm:cxn modelId="{8EBF857E-7408-4941-91E4-293B0F59EEF7}" srcId="{6A70FD8F-0050-42E3-8B3A-6ED7CFB9852E}" destId="{C5146535-FD3D-4589-98A3-623B8DA4B8DB}" srcOrd="1" destOrd="0" parTransId="{20848F78-EC70-4162-96CE-CC68006930F0}" sibTransId="{7A3CCAF8-AC3A-401E-AEDD-44BBC1AA9C31}"/>
-    <dgm:cxn modelId="{23ECAC8B-17A4-4883-AA0E-06D66B7E788A}" srcId="{6A70FD8F-0050-42E3-8B3A-6ED7CFB9852E}" destId="{09C152DA-7620-4852-8162-A77EC3609F3F}" srcOrd="2" destOrd="0" parTransId="{9F6D14C0-6C82-4CBD-8D6D-B0E117B6F2ED}" sibTransId="{0AE8D36D-0F0F-4206-AE39-0A2D73987B68}"/>
-    <dgm:cxn modelId="{F9540599-A193-456C-A9A9-8962E3855B0B}" type="presOf" srcId="{96262926-A67D-4E4E-9515-5EBC67F0B634}" destId="{5A1B764B-0DC5-47CD-BDEA-9E67799496EC}" srcOrd="0" destOrd="0" presId="urn:microsoft.com/office/officeart/2016/7/layout/RoundedRectangleTimeline"/>
-    <dgm:cxn modelId="{E13585A2-54F2-486A-B317-F4D6AF7E83B9}" type="presOf" srcId="{E80CA270-6C90-4E17-ACEA-46B56AD54DD1}" destId="{DF65791B-462E-4589-B98D-F60587330CA8}" srcOrd="0" destOrd="0" presId="urn:microsoft.com/office/officeart/2016/7/layout/RoundedRectangleTimeline"/>
-    <dgm:cxn modelId="{FAA8D3DD-12E8-457D-9144-B037C5678347}" srcId="{09C152DA-7620-4852-8162-A77EC3609F3F}" destId="{6C8937BE-93F8-4DED-8538-1C601DAEBA66}" srcOrd="0" destOrd="0" parTransId="{77D169C6-D77F-456D-B18B-D7BE016AD87A}" sibTransId="{A97BE953-FA9D-4BA6-A92C-494DB1F3BA59}"/>
-    <dgm:cxn modelId="{C5202EE1-10E9-4076-9D55-9E0CF8B152AF}" srcId="{6A70FD8F-0050-42E3-8B3A-6ED7CFB9852E}" destId="{8DB5D7D5-6A1C-4ABC-8850-759A9D876047}" srcOrd="0" destOrd="0" parTransId="{D8874F40-D7B0-41DE-BB6F-A6014FEAB2D7}" sibTransId="{BD6E0A2E-99C8-4F5A-971A-CD211D1099FF}"/>
-    <dgm:cxn modelId="{2DC28DF8-5C1B-4F53-A4C1-D5B63FB54BAF}" srcId="{C5146535-FD3D-4589-98A3-623B8DA4B8DB}" destId="{E80CA270-6C90-4E17-ACEA-46B56AD54DD1}" srcOrd="0" destOrd="0" parTransId="{7EEC8067-96EF-4BE0-8BE3-BA59ED78A31F}" sibTransId="{1AFE46E5-6B07-4894-8ECB-21BD7E7B8AF1}"/>
     <dgm:cxn modelId="{76459B4A-BC95-4631-A3CC-1410E80D5DFD}" type="presParOf" srcId="{AB52B3CC-6563-466D-BFC3-9B6B5AFA0881}" destId="{815EDF7B-AC93-4A61-87AA-CAA5D85C31A8}" srcOrd="0" destOrd="0" presId="urn:microsoft.com/office/officeart/2016/7/layout/RoundedRectangleTimeline"/>
     <dgm:cxn modelId="{4238FA88-CE43-4680-BFB0-73DED5612698}" type="presParOf" srcId="{815EDF7B-AC93-4A61-87AA-CAA5D85C31A8}" destId="{954381E7-0584-46DD-8108-E9BF4F2B5005}" srcOrd="0" destOrd="0" presId="urn:microsoft.com/office/officeart/2016/7/layout/RoundedRectangleTimeline"/>
     <dgm:cxn modelId="{6497CE05-0893-4952-B18A-28D71D90B841}" type="presParOf" srcId="{815EDF7B-AC93-4A61-87AA-CAA5D85C31A8}" destId="{5A1B764B-0DC5-47CD-BDEA-9E67799496EC}" srcOrd="1" destOrd="0" presId="urn:microsoft.com/office/officeart/2016/7/layout/RoundedRectangleTimeline"/>
@@ -1540,7 +1589,7 @@
         </a:bodyPr>
         <a:lstStyle/>
         <a:p>
-          <a:pPr marL="0" lvl="0" indent="0" algn="ctr" defTabSz="488950">
+          <a:pPr lvl="0" algn="ctr" defTabSz="488950">
             <a:lnSpc>
               <a:spcPct val="90000"/>
             </a:lnSpc>
@@ -1550,7 +1599,6 @@
             <a:spcAft>
               <a:spcPct val="35000"/>
             </a:spcAft>
-            <a:buNone/>
           </a:pPr>
           <a:r>
             <a:rPr lang="en-US" sz="1100" kern="1200" dirty="0"/>
@@ -1600,7 +1648,7 @@
         </a:bodyPr>
         <a:lstStyle/>
         <a:p>
-          <a:pPr marL="0" lvl="0" indent="0" algn="ctr" defTabSz="488950">
+          <a:pPr lvl="0" algn="ctr" defTabSz="488950">
             <a:lnSpc>
               <a:spcPct val="90000"/>
             </a:lnSpc>
@@ -1610,7 +1658,6 @@
             <a:spcAft>
               <a:spcPct val="35000"/>
             </a:spcAft>
-            <a:buNone/>
           </a:pPr>
           <a:r>
             <a:rPr lang="en-US" sz="1100" kern="1200" dirty="0"/>
@@ -1766,7 +1813,7 @@
         </a:bodyPr>
         <a:lstStyle/>
         <a:p>
-          <a:pPr marL="0" lvl="0" indent="0" algn="ctr" defTabSz="488950">
+          <a:pPr lvl="0" algn="ctr" defTabSz="488950">
             <a:lnSpc>
               <a:spcPct val="90000"/>
             </a:lnSpc>
@@ -1776,7 +1823,6 @@
             <a:spcAft>
               <a:spcPct val="35000"/>
             </a:spcAft>
-            <a:buNone/>
           </a:pPr>
           <a:r>
             <a:rPr lang="en-US" sz="1100" kern="1200" dirty="0"/>
@@ -1826,7 +1872,7 @@
         </a:bodyPr>
         <a:lstStyle/>
         <a:p>
-          <a:pPr marL="0" lvl="0" indent="0" algn="ctr" defTabSz="488950">
+          <a:pPr lvl="0" algn="ctr" defTabSz="488950">
             <a:lnSpc>
               <a:spcPct val="90000"/>
             </a:lnSpc>
@@ -1836,7 +1882,6 @@
             <a:spcAft>
               <a:spcPct val="35000"/>
             </a:spcAft>
-            <a:buNone/>
           </a:pPr>
           <a:r>
             <a:rPr lang="en-US" sz="1100" kern="1200" dirty="0"/>
@@ -1992,7 +2037,7 @@
         </a:bodyPr>
         <a:lstStyle/>
         <a:p>
-          <a:pPr marL="0" lvl="0" indent="0" algn="ctr" defTabSz="488950">
+          <a:pPr lvl="0" algn="ctr" defTabSz="488950">
             <a:lnSpc>
               <a:spcPct val="90000"/>
             </a:lnSpc>
@@ -2002,7 +2047,6 @@
             <a:spcAft>
               <a:spcPct val="35000"/>
             </a:spcAft>
-            <a:buNone/>
           </a:pPr>
           <a:r>
             <a:rPr lang="en-US" sz="1100" kern="1200" dirty="0"/>
@@ -2052,7 +2096,7 @@
         </a:bodyPr>
         <a:lstStyle/>
         <a:p>
-          <a:pPr marL="0" lvl="0" indent="0" algn="ctr" defTabSz="488950">
+          <a:pPr lvl="0" algn="ctr" defTabSz="488950">
             <a:lnSpc>
               <a:spcPct val="90000"/>
             </a:lnSpc>
@@ -2062,7 +2106,6 @@
             <a:spcAft>
               <a:spcPct val="35000"/>
             </a:spcAft>
-            <a:buNone/>
           </a:pPr>
           <a:r>
             <a:rPr lang="en-US" sz="1100" kern="1200" dirty="0"/>
@@ -2494,7 +2537,7 @@
                 <dgm:adjLst/>
                 <dgm:extLst>
                   <a:ext uri="{B698B0E9-8C71-41B9-8309-B3DCBF30829C}">
-                    <dgm1612:spPr xmlns:dgm1612="http://schemas.microsoft.com/office/drawing/2016/12/diagram">
+                    <dgm1612:spPr xmlns="" xmlns:dgm1612="http://schemas.microsoft.com/office/drawing/2016/12/diagram">
                       <a:ln>
                         <a:prstDash val="dash"/>
                       </a:ln>
@@ -2705,7 +2748,7 @@
                 <dgm:adjLst/>
                 <dgm:extLst>
                   <a:ext uri="{B698B0E9-8C71-41B9-8309-B3DCBF30829C}">
-                    <dgm1612:spPr xmlns:dgm1612="http://schemas.microsoft.com/office/drawing/2016/12/diagram">
+                    <dgm1612:spPr xmlns="" xmlns:dgm1612="http://schemas.microsoft.com/office/drawing/2016/12/diagram">
                       <a:ln>
                         <a:prstDash val="dash"/>
                       </a:ln>
@@ -9317,7 +9360,7 @@
           <p:cNvPr id="2" name="Title 1">
             <a:extLst>
               <a:ext uri="{FF2B5EF4-FFF2-40B4-BE49-F238E27FC236}">
-                <a16:creationId xmlns:a16="http://schemas.microsoft.com/office/drawing/2014/main" id="{1C21E816-31F5-48BB-BD02-D15F2F18B48A}"/>
+                <a16:creationId xmlns="" xmlns:a16="http://schemas.microsoft.com/office/drawing/2014/main" id="{1C21E816-31F5-48BB-BD02-D15F2F18B48A}"/>
               </a:ext>
             </a:extLst>
           </p:cNvPr>
@@ -9330,7 +9373,7 @@
         </p:nvSpPr>
         <p:spPr>
           <a:xfrm>
-            <a:off x="1823869" y="107845"/>
+            <a:off x="1836932" y="0"/>
             <a:ext cx="9001462" cy="2387600"/>
           </a:xfrm>
         </p:spPr>
@@ -9352,7 +9395,7 @@
           <p:cNvPr id="3" name="Subtitle 2">
             <a:extLst>
               <a:ext uri="{FF2B5EF4-FFF2-40B4-BE49-F238E27FC236}">
-                <a16:creationId xmlns:a16="http://schemas.microsoft.com/office/drawing/2014/main" id="{835D6E6B-3353-491C-A3C6-F278D6CED8B3}"/>
+                <a16:creationId xmlns="" xmlns:a16="http://schemas.microsoft.com/office/drawing/2014/main" id="{835D6E6B-3353-491C-A3C6-F278D6CED8B3}"/>
               </a:ext>
             </a:extLst>
           </p:cNvPr>
@@ -9365,20 +9408,27 @@
         </p:nvSpPr>
         <p:spPr>
           <a:xfrm>
-            <a:off x="581194" y="2495445"/>
-            <a:ext cx="10993546" cy="468233"/>
+            <a:off x="7680959" y="169817"/>
+            <a:ext cx="4315097" cy="783772"/>
           </a:xfrm>
         </p:spPr>
         <p:txBody>
           <a:bodyPr>
-            <a:normAutofit lnSpcReduction="10000"/>
+            <a:normAutofit fontScale="70000" lnSpcReduction="20000"/>
           </a:bodyPr>
           <a:lstStyle/>
           <a:p>
             <a:r>
-              <a:rPr lang="en-US" dirty="0"/>
-              <a:t>BY CODERS, FOR CODERS</a:t>
-            </a:r>
+              <a:rPr lang="en-US" dirty="0" smtClean="0"/>
+              <a:t>ABHINANDAN SHARMA(2K19/MC/005)</a:t>
+            </a:r>
+          </a:p>
+          <a:p>
+            <a:r>
+              <a:rPr lang="en-US" dirty="0" smtClean="0"/>
+              <a:t>CHETAN(2K19/MC/034)</a:t>
+            </a:r>
+            <a:endParaRPr lang="en-US" dirty="0"/>
           </a:p>
         </p:txBody>
       </p:sp>
@@ -9387,7 +9437,7 @@
           <p:cNvPr id="6" name="Picture 5" descr="abstract image">
             <a:extLst>
               <a:ext uri="{FF2B5EF4-FFF2-40B4-BE49-F238E27FC236}">
-                <a16:creationId xmlns:a16="http://schemas.microsoft.com/office/drawing/2014/main" id="{F1A8C364-94D4-4630-BAD0-78722F347055}"/>
+                <a16:creationId xmlns="" xmlns:a16="http://schemas.microsoft.com/office/drawing/2014/main" id="{F1A8C364-94D4-4630-BAD0-78722F347055}"/>
               </a:ext>
             </a:extLst>
           </p:cNvPr>
@@ -9417,6 +9467,269 @@
           </a:prstGeom>
         </p:spPr>
       </p:pic>
+      <p:sp>
+        <p:nvSpPr>
+          <p:cNvPr id="5" name="Subtitle 2">
+            <a:extLst>
+              <a:ext uri="{FF2B5EF4-FFF2-40B4-BE49-F238E27FC236}">
+                <a16:creationId xmlns="" xmlns:a16="http://schemas.microsoft.com/office/drawing/2014/main" id="{835D6E6B-3353-491C-A3C6-F278D6CED8B3}"/>
+              </a:ext>
+            </a:extLst>
+          </p:cNvPr>
+          <p:cNvSpPr txBox="1">
+            <a:spLocks/>
+          </p:cNvSpPr>
+          <p:nvPr/>
+        </p:nvSpPr>
+        <p:spPr>
+          <a:xfrm>
+            <a:off x="733594" y="2517217"/>
+            <a:ext cx="10993546" cy="468233"/>
+          </a:xfrm>
+          <a:prstGeom prst="rect">
+            <a:avLst/>
+          </a:prstGeom>
+        </p:spPr>
+        <p:txBody>
+          <a:bodyPr vert="horz" lIns="91440" tIns="45720" rIns="91440" bIns="45720" rtlCol="0">
+            <a:normAutofit fontScale="92500" lnSpcReduction="10000"/>
+          </a:bodyPr>
+          <a:lstStyle>
+            <a:lvl1pPr marL="0" indent="0" algn="ctr" defTabSz="914400" rtl="0" eaLnBrk="1" latinLnBrk="0" hangingPunct="1">
+              <a:lnSpc>
+                <a:spcPct val="120000"/>
+              </a:lnSpc>
+              <a:spcBef>
+                <a:spcPts val="1000"/>
+              </a:spcBef>
+              <a:buFont typeface="Arial" panose="020B0604020202020204" pitchFamily="34" charset="0"/>
+              <a:buNone/>
+              <a:defRPr sz="2400" kern="1200">
+                <a:solidFill>
+                  <a:schemeClr val="tx1"/>
+                </a:solidFill>
+                <a:effectLst>
+                  <a:outerShdw blurRad="50800" dist="38100" dir="2700000" algn="tl" rotWithShape="0">
+                    <a:srgbClr val="000000">
+                      <a:alpha val="48000"/>
+                    </a:srgbClr>
+                  </a:outerShdw>
+                </a:effectLst>
+                <a:latin typeface="+mn-lt"/>
+                <a:ea typeface="+mn-ea"/>
+                <a:cs typeface="+mn-cs"/>
+              </a:defRPr>
+            </a:lvl1pPr>
+            <a:lvl2pPr marL="457200" indent="0" algn="ctr" defTabSz="914400" rtl="0" eaLnBrk="1" latinLnBrk="0" hangingPunct="1">
+              <a:lnSpc>
+                <a:spcPct val="120000"/>
+              </a:lnSpc>
+              <a:spcBef>
+                <a:spcPts val="500"/>
+              </a:spcBef>
+              <a:buFont typeface="Arial" panose="020B0604020202020204" pitchFamily="34" charset="0"/>
+              <a:buNone/>
+              <a:defRPr sz="2000" kern="1200">
+                <a:solidFill>
+                  <a:schemeClr val="tx1"/>
+                </a:solidFill>
+                <a:effectLst>
+                  <a:outerShdw blurRad="50800" dist="38100" dir="2700000" algn="tl" rotWithShape="0">
+                    <a:srgbClr val="000000">
+                      <a:alpha val="48000"/>
+                    </a:srgbClr>
+                  </a:outerShdw>
+                </a:effectLst>
+                <a:latin typeface="+mn-lt"/>
+                <a:ea typeface="+mn-ea"/>
+                <a:cs typeface="+mn-cs"/>
+              </a:defRPr>
+            </a:lvl2pPr>
+            <a:lvl3pPr marL="914400" indent="0" algn="ctr" defTabSz="914400" rtl="0" eaLnBrk="1" latinLnBrk="0" hangingPunct="1">
+              <a:lnSpc>
+                <a:spcPct val="120000"/>
+              </a:lnSpc>
+              <a:spcBef>
+                <a:spcPts val="500"/>
+              </a:spcBef>
+              <a:buFont typeface="Arial" panose="020B0604020202020204" pitchFamily="34" charset="0"/>
+              <a:buNone/>
+              <a:defRPr sz="1800" kern="1200">
+                <a:solidFill>
+                  <a:schemeClr val="tx1"/>
+                </a:solidFill>
+                <a:effectLst>
+                  <a:outerShdw blurRad="50800" dist="38100" dir="2700000" algn="tl" rotWithShape="0">
+                    <a:srgbClr val="000000">
+                      <a:alpha val="48000"/>
+                    </a:srgbClr>
+                  </a:outerShdw>
+                </a:effectLst>
+                <a:latin typeface="+mn-lt"/>
+                <a:ea typeface="+mn-ea"/>
+                <a:cs typeface="+mn-cs"/>
+              </a:defRPr>
+            </a:lvl3pPr>
+            <a:lvl4pPr marL="1371600" indent="0" algn="ctr" defTabSz="914400" rtl="0" eaLnBrk="1" latinLnBrk="0" hangingPunct="1">
+              <a:lnSpc>
+                <a:spcPct val="120000"/>
+              </a:lnSpc>
+              <a:spcBef>
+                <a:spcPts val="500"/>
+              </a:spcBef>
+              <a:buFont typeface="Arial" panose="020B0604020202020204" pitchFamily="34" charset="0"/>
+              <a:buNone/>
+              <a:defRPr sz="1600" kern="1200">
+                <a:solidFill>
+                  <a:schemeClr val="tx1"/>
+                </a:solidFill>
+                <a:effectLst>
+                  <a:outerShdw blurRad="50800" dist="38100" dir="2700000" algn="tl" rotWithShape="0">
+                    <a:srgbClr val="000000">
+                      <a:alpha val="48000"/>
+                    </a:srgbClr>
+                  </a:outerShdw>
+                </a:effectLst>
+                <a:latin typeface="+mn-lt"/>
+                <a:ea typeface="+mn-ea"/>
+                <a:cs typeface="+mn-cs"/>
+              </a:defRPr>
+            </a:lvl4pPr>
+            <a:lvl5pPr marL="1828800" indent="0" algn="ctr" defTabSz="914400" rtl="0" eaLnBrk="1" latinLnBrk="0" hangingPunct="1">
+              <a:lnSpc>
+                <a:spcPct val="120000"/>
+              </a:lnSpc>
+              <a:spcBef>
+                <a:spcPts val="500"/>
+              </a:spcBef>
+              <a:buFont typeface="Arial" panose="020B0604020202020204" pitchFamily="34" charset="0"/>
+              <a:buNone/>
+              <a:defRPr sz="1600" kern="1200">
+                <a:solidFill>
+                  <a:schemeClr val="tx1"/>
+                </a:solidFill>
+                <a:effectLst>
+                  <a:outerShdw blurRad="50800" dist="38100" dir="2700000" algn="tl" rotWithShape="0">
+                    <a:srgbClr val="000000">
+                      <a:alpha val="48000"/>
+                    </a:srgbClr>
+                  </a:outerShdw>
+                </a:effectLst>
+                <a:latin typeface="+mn-lt"/>
+                <a:ea typeface="+mn-ea"/>
+                <a:cs typeface="+mn-cs"/>
+              </a:defRPr>
+            </a:lvl5pPr>
+            <a:lvl6pPr marL="2286000" indent="0" algn="ctr" defTabSz="914400" rtl="0" eaLnBrk="1" latinLnBrk="0" hangingPunct="1">
+              <a:lnSpc>
+                <a:spcPct val="120000"/>
+              </a:lnSpc>
+              <a:spcBef>
+                <a:spcPts val="500"/>
+              </a:spcBef>
+              <a:buFont typeface="Arial" panose="020B0604020202020204" pitchFamily="34" charset="0"/>
+              <a:buNone/>
+              <a:defRPr sz="1600" kern="1200">
+                <a:solidFill>
+                  <a:schemeClr val="tx1"/>
+                </a:solidFill>
+                <a:effectLst>
+                  <a:outerShdw blurRad="50800" dist="38100" dir="2700000" algn="tl" rotWithShape="0">
+                    <a:srgbClr val="000000">
+                      <a:alpha val="48000"/>
+                    </a:srgbClr>
+                  </a:outerShdw>
+                </a:effectLst>
+                <a:latin typeface="+mn-lt"/>
+                <a:ea typeface="+mn-ea"/>
+                <a:cs typeface="+mn-cs"/>
+              </a:defRPr>
+            </a:lvl6pPr>
+            <a:lvl7pPr marL="2743200" indent="0" algn="ctr" defTabSz="914400" rtl="0" eaLnBrk="1" latinLnBrk="0" hangingPunct="1">
+              <a:lnSpc>
+                <a:spcPct val="120000"/>
+              </a:lnSpc>
+              <a:spcBef>
+                <a:spcPts val="500"/>
+              </a:spcBef>
+              <a:buFont typeface="Arial" panose="020B0604020202020204" pitchFamily="34" charset="0"/>
+              <a:buNone/>
+              <a:defRPr sz="1600" kern="1200">
+                <a:solidFill>
+                  <a:schemeClr val="tx1"/>
+                </a:solidFill>
+                <a:effectLst>
+                  <a:outerShdw blurRad="50800" dist="38100" dir="2700000" algn="tl" rotWithShape="0">
+                    <a:srgbClr val="000000">
+                      <a:alpha val="48000"/>
+                    </a:srgbClr>
+                  </a:outerShdw>
+                </a:effectLst>
+                <a:latin typeface="+mn-lt"/>
+                <a:ea typeface="+mn-ea"/>
+                <a:cs typeface="+mn-cs"/>
+              </a:defRPr>
+            </a:lvl7pPr>
+            <a:lvl8pPr marL="3200400" indent="0" algn="ctr" defTabSz="914400" rtl="0" eaLnBrk="1" latinLnBrk="0" hangingPunct="1">
+              <a:lnSpc>
+                <a:spcPct val="120000"/>
+              </a:lnSpc>
+              <a:spcBef>
+                <a:spcPts val="500"/>
+              </a:spcBef>
+              <a:buFont typeface="Arial" panose="020B0604020202020204" pitchFamily="34" charset="0"/>
+              <a:buNone/>
+              <a:defRPr sz="1600" kern="1200">
+                <a:solidFill>
+                  <a:schemeClr val="tx1"/>
+                </a:solidFill>
+                <a:effectLst>
+                  <a:outerShdw blurRad="50800" dist="38100" dir="2700000" algn="tl" rotWithShape="0">
+                    <a:srgbClr val="000000">
+                      <a:alpha val="48000"/>
+                    </a:srgbClr>
+                  </a:outerShdw>
+                </a:effectLst>
+                <a:latin typeface="+mn-lt"/>
+                <a:ea typeface="+mn-ea"/>
+                <a:cs typeface="+mn-cs"/>
+              </a:defRPr>
+            </a:lvl8pPr>
+            <a:lvl9pPr marL="3657600" indent="0" algn="ctr" defTabSz="914400" rtl="0" eaLnBrk="1" latinLnBrk="0" hangingPunct="1">
+              <a:lnSpc>
+                <a:spcPct val="120000"/>
+              </a:lnSpc>
+              <a:spcBef>
+                <a:spcPts val="500"/>
+              </a:spcBef>
+              <a:buFont typeface="Arial" panose="020B0604020202020204" pitchFamily="34" charset="0"/>
+              <a:buNone/>
+              <a:defRPr sz="1600" kern="1200">
+                <a:solidFill>
+                  <a:schemeClr val="tx1"/>
+                </a:solidFill>
+                <a:effectLst>
+                  <a:outerShdw blurRad="50800" dist="38100" dir="2700000" algn="tl" rotWithShape="0">
+                    <a:srgbClr val="000000">
+                      <a:alpha val="48000"/>
+                    </a:srgbClr>
+                  </a:outerShdw>
+                </a:effectLst>
+                <a:latin typeface="+mn-lt"/>
+                <a:ea typeface="+mn-ea"/>
+                <a:cs typeface="+mn-cs"/>
+              </a:defRPr>
+            </a:lvl9pPr>
+          </a:lstStyle>
+          <a:p>
+            <a:r>
+              <a:rPr lang="en-US" dirty="0" smtClean="0"/>
+              <a:t>BY CODERS, FOR CODERS</a:t>
+            </a:r>
+            <a:endParaRPr lang="en-US" dirty="0"/>
+          </a:p>
+        </p:txBody>
+      </p:sp>
     </p:spTree>
     <p:extLst>
       <p:ext uri="{BB962C8B-B14F-4D97-AF65-F5344CB8AC3E}">
@@ -9452,7 +9765,7 @@
           <p:cNvPr id="2" name="Title 1">
             <a:extLst>
               <a:ext uri="{FF2B5EF4-FFF2-40B4-BE49-F238E27FC236}">
-                <a16:creationId xmlns:a16="http://schemas.microsoft.com/office/drawing/2014/main" id="{5E562972-3449-42D1-8185-B4BEFD52AB44}"/>
+                <a16:creationId xmlns="" xmlns:a16="http://schemas.microsoft.com/office/drawing/2014/main" id="{5E562972-3449-42D1-8185-B4BEFD52AB44}"/>
               </a:ext>
             </a:extLst>
           </p:cNvPr>
@@ -9515,7 +9828,7 @@
           <p:cNvPr id="2" name="Title 1">
             <a:extLst>
               <a:ext uri="{FF2B5EF4-FFF2-40B4-BE49-F238E27FC236}">
-                <a16:creationId xmlns:a16="http://schemas.microsoft.com/office/drawing/2014/main" id="{5E562972-3449-42D1-8185-B4BEFD52AB44}"/>
+                <a16:creationId xmlns="" xmlns:a16="http://schemas.microsoft.com/office/drawing/2014/main" id="{5E562972-3449-42D1-8185-B4BEFD52AB44}"/>
               </a:ext>
             </a:extLst>
           </p:cNvPr>
@@ -9548,7 +9861,7 @@
           <p:cNvPr id="8" name="Content Placeholder 7">
             <a:extLst>
               <a:ext uri="{FF2B5EF4-FFF2-40B4-BE49-F238E27FC236}">
-                <a16:creationId xmlns:a16="http://schemas.microsoft.com/office/drawing/2014/main" id="{256A640F-0DE8-43AE-9A44-74B302AB9BE7}"/>
+                <a16:creationId xmlns="" xmlns:a16="http://schemas.microsoft.com/office/drawing/2014/main" id="{256A640F-0DE8-43AE-9A44-74B302AB9BE7}"/>
               </a:ext>
             </a:extLst>
           </p:cNvPr>
@@ -9623,7 +9936,7 @@
           <p:cNvPr id="2" name="Title 1">
             <a:extLst>
               <a:ext uri="{FF2B5EF4-FFF2-40B4-BE49-F238E27FC236}">
-                <a16:creationId xmlns:a16="http://schemas.microsoft.com/office/drawing/2014/main" id="{5E562972-3449-42D1-8185-B4BEFD52AB44}"/>
+                <a16:creationId xmlns="" xmlns:a16="http://schemas.microsoft.com/office/drawing/2014/main" id="{5E562972-3449-42D1-8185-B4BEFD52AB44}"/>
               </a:ext>
             </a:extLst>
           </p:cNvPr>
@@ -9659,7 +9972,7 @@
           <p:cNvPr id="4" name="Content Placeholder 2" descr="timeline">
             <a:extLst>
               <a:ext uri="{FF2B5EF4-FFF2-40B4-BE49-F238E27FC236}">
-                <a16:creationId xmlns:a16="http://schemas.microsoft.com/office/drawing/2014/main" id="{FF3F0D82-0AA6-45C3-8367-955CBFA02ED6}"/>
+                <a16:creationId xmlns="" xmlns:a16="http://schemas.microsoft.com/office/drawing/2014/main" id="{FF3F0D82-0AA6-45C3-8367-955CBFA02ED6}"/>
               </a:ext>
             </a:extLst>
           </p:cNvPr>
@@ -9720,7 +10033,7 @@
           <p:cNvPr id="2" name="Title 1">
             <a:extLst>
               <a:ext uri="{FF2B5EF4-FFF2-40B4-BE49-F238E27FC236}">
-                <a16:creationId xmlns:a16="http://schemas.microsoft.com/office/drawing/2014/main" id="{5E562972-3449-42D1-8185-B4BEFD52AB44}"/>
+                <a16:creationId xmlns="" xmlns:a16="http://schemas.microsoft.com/office/drawing/2014/main" id="{5E562972-3449-42D1-8185-B4BEFD52AB44}"/>
               </a:ext>
             </a:extLst>
           </p:cNvPr>
@@ -9753,7 +10066,7 @@
           <p:cNvPr id="8" name="Content Placeholder 7">
             <a:extLst>
               <a:ext uri="{FF2B5EF4-FFF2-40B4-BE49-F238E27FC236}">
-                <a16:creationId xmlns:a16="http://schemas.microsoft.com/office/drawing/2014/main" id="{256A640F-0DE8-43AE-9A44-74B302AB9BE7}"/>
+                <a16:creationId xmlns="" xmlns:a16="http://schemas.microsoft.com/office/drawing/2014/main" id="{256A640F-0DE8-43AE-9A44-74B302AB9BE7}"/>
               </a:ext>
             </a:extLst>
           </p:cNvPr>
@@ -9829,7 +10142,7 @@
           <p:cNvPr id="2" name="Title 1">
             <a:extLst>
               <a:ext uri="{FF2B5EF4-FFF2-40B4-BE49-F238E27FC236}">
-                <a16:creationId xmlns:a16="http://schemas.microsoft.com/office/drawing/2014/main" id="{5E562972-3449-42D1-8185-B4BEFD52AB44}"/>
+                <a16:creationId xmlns="" xmlns:a16="http://schemas.microsoft.com/office/drawing/2014/main" id="{5E562972-3449-42D1-8185-B4BEFD52AB44}"/>
               </a:ext>
             </a:extLst>
           </p:cNvPr>
@@ -9862,7 +10175,7 @@
           <p:cNvPr id="8" name="Content Placeholder 7">
             <a:extLst>
               <a:ext uri="{FF2B5EF4-FFF2-40B4-BE49-F238E27FC236}">
-                <a16:creationId xmlns:a16="http://schemas.microsoft.com/office/drawing/2014/main" id="{256A640F-0DE8-43AE-9A44-74B302AB9BE7}"/>
+                <a16:creationId xmlns="" xmlns:a16="http://schemas.microsoft.com/office/drawing/2014/main" id="{256A640F-0DE8-43AE-9A44-74B302AB9BE7}"/>
               </a:ext>
             </a:extLst>
           </p:cNvPr>
@@ -9933,7 +10246,7 @@
           <p:cNvPr id="2" name="Title 1">
             <a:extLst>
               <a:ext uri="{FF2B5EF4-FFF2-40B4-BE49-F238E27FC236}">
-                <a16:creationId xmlns:a16="http://schemas.microsoft.com/office/drawing/2014/main" id="{5E562972-3449-42D1-8185-B4BEFD52AB44}"/>
+                <a16:creationId xmlns="" xmlns:a16="http://schemas.microsoft.com/office/drawing/2014/main" id="{5E562972-3449-42D1-8185-B4BEFD52AB44}"/>
               </a:ext>
             </a:extLst>
           </p:cNvPr>
@@ -9966,7 +10279,7 @@
           <p:cNvPr id="8" name="Content Placeholder 7">
             <a:extLst>
               <a:ext uri="{FF2B5EF4-FFF2-40B4-BE49-F238E27FC236}">
-                <a16:creationId xmlns:a16="http://schemas.microsoft.com/office/drawing/2014/main" id="{256A640F-0DE8-43AE-9A44-74B302AB9BE7}"/>
+                <a16:creationId xmlns="" xmlns:a16="http://schemas.microsoft.com/office/drawing/2014/main" id="{256A640F-0DE8-43AE-9A44-74B302AB9BE7}"/>
               </a:ext>
             </a:extLst>
           </p:cNvPr>
@@ -9999,8 +10312,13 @@
             </a:pPr>
             <a:r>
               <a:rPr lang="en-US" dirty="0"/>
-              <a:t> HTML</a:t>
-            </a:r>
+              <a:t> </a:t>
+            </a:r>
+            <a:r>
+              <a:rPr lang="en-US" dirty="0" smtClean="0"/>
+              <a:t>HTML</a:t>
+            </a:r>
+            <a:endParaRPr lang="en-US" dirty="0"/>
           </a:p>
           <a:p>
             <a:pPr>
@@ -10071,6 +10389,443 @@
           </a:p>
         </p:txBody>
       </p:sp>
+      <p:sp>
+        <p:nvSpPr>
+          <p:cNvPr id="4" name="Rectangle 1"/>
+          <p:cNvSpPr>
+            <a:spLocks noChangeArrowheads="1"/>
+          </p:cNvSpPr>
+          <p:nvPr/>
+        </p:nvSpPr>
+        <p:spPr bwMode="auto">
+          <a:xfrm>
+            <a:off x="0" y="0"/>
+            <a:ext cx="12192000" cy="0"/>
+          </a:xfrm>
+          <a:prstGeom prst="rect">
+            <a:avLst/>
+          </a:prstGeom>
+          <a:noFill/>
+          <a:ln>
+            <a:noFill/>
+          </a:ln>
+          <a:effectLst/>
+          <a:extLst>
+            <a:ext uri="{909E8E84-426E-40DD-AFC4-6F175D3DCCD1}">
+              <a14:hiddenFill xmlns:a14="http://schemas.microsoft.com/office/drawing/2010/main">
+                <a:solidFill>
+                  <a:schemeClr val="accent1"/>
+                </a:solidFill>
+              </a14:hiddenFill>
+            </a:ext>
+            <a:ext uri="{91240B29-F687-4F45-9708-019B960494DF}">
+              <a14:hiddenLine xmlns:a14="http://schemas.microsoft.com/office/drawing/2010/main" w="9525">
+                <a:solidFill>
+                  <a:schemeClr val="tx1"/>
+                </a:solidFill>
+                <a:miter lim="800000"/>
+                <a:headEnd/>
+                <a:tailEnd/>
+              </a14:hiddenLine>
+            </a:ext>
+            <a:ext uri="{AF507438-7753-43E0-B8FC-AC1667EBCBE1}">
+              <a14:hiddenEffects xmlns:a14="http://schemas.microsoft.com/office/drawing/2010/main">
+                <a:effectLst>
+                  <a:outerShdw dist="35921" dir="2700000" algn="ctr" rotWithShape="0">
+                    <a:schemeClr val="bg2"/>
+                  </a:outerShdw>
+                </a:effectLst>
+              </a14:hiddenEffects>
+            </a:ext>
+          </a:extLst>
+        </p:spPr>
+        <p:txBody>
+          <a:bodyPr vert="horz" wrap="none" lIns="91440" tIns="45720" rIns="91440" bIns="45720" numCol="1" anchor="ctr" anchorCtr="0" compatLnSpc="1">
+            <a:prstTxWarp prst="textNoShape">
+              <a:avLst/>
+            </a:prstTxWarp>
+            <a:spAutoFit/>
+          </a:bodyPr>
+          <a:lstStyle/>
+          <a:p>
+            <a:pPr marL="0" marR="0" lvl="0" indent="0" algn="l" defTabSz="914400" rtl="0" eaLnBrk="1" fontAlgn="base" latinLnBrk="0" hangingPunct="1">
+              <a:lnSpc>
+                <a:spcPct val="100000"/>
+              </a:lnSpc>
+              <a:spcBef>
+                <a:spcPct val="0"/>
+              </a:spcBef>
+              <a:spcAft>
+                <a:spcPct val="0"/>
+              </a:spcAft>
+              <a:buClrTx/>
+              <a:buSzTx/>
+              <a:buFontTx/>
+              <a:buNone/>
+              <a:tabLst/>
+            </a:pPr>
+            <a:endParaRPr kumimoji="0" lang="en-US" sz="1800" b="0" i="0" u="none" strike="noStrike" cap="none" normalizeH="0" baseline="0" smtClean="0">
+              <a:ln>
+                <a:noFill/>
+              </a:ln>
+              <a:solidFill>
+                <a:schemeClr val="tx1"/>
+              </a:solidFill>
+              <a:effectLst/>
+              <a:latin typeface="Arial" charset="0"/>
+              <a:cs typeface="Arial" charset="0"/>
+            </a:endParaRPr>
+          </a:p>
+        </p:txBody>
+      </p:sp>
+      <p:sp>
+        <p:nvSpPr>
+          <p:cNvPr id="5" name="AutoShape 4" descr="Html5 - Free computer icons"/>
+          <p:cNvSpPr>
+            <a:spLocks noChangeAspect="1" noChangeArrowheads="1"/>
+          </p:cNvSpPr>
+          <p:nvPr/>
+        </p:nvSpPr>
+        <p:spPr bwMode="auto">
+          <a:xfrm>
+            <a:off x="155575" y="-144463"/>
+            <a:ext cx="304800" cy="304801"/>
+          </a:xfrm>
+          <a:prstGeom prst="rect">
+            <a:avLst/>
+          </a:prstGeom>
+          <a:noFill/>
+          <a:extLst>
+            <a:ext uri="{909E8E84-426E-40DD-AFC4-6F175D3DCCD1}">
+              <a14:hiddenFill xmlns:a14="http://schemas.microsoft.com/office/drawing/2010/main">
+                <a:solidFill>
+                  <a:srgbClr val="FFFFFF"/>
+                </a:solidFill>
+              </a14:hiddenFill>
+            </a:ext>
+          </a:extLst>
+        </p:spPr>
+        <p:txBody>
+          <a:bodyPr vert="horz" wrap="square" lIns="91440" tIns="45720" rIns="91440" bIns="45720" numCol="1" anchor="t" anchorCtr="0" compatLnSpc="1">
+            <a:prstTxWarp prst="textNoShape">
+              <a:avLst/>
+            </a:prstTxWarp>
+          </a:bodyPr>
+          <a:lstStyle/>
+          <a:p>
+            <a:endParaRPr lang="en-US"/>
+          </a:p>
+        </p:txBody>
+      </p:sp>
+      <p:sp>
+        <p:nvSpPr>
+          <p:cNvPr id="7" name="AutoShape 6" descr="Html5 - Free computer icons"/>
+          <p:cNvSpPr>
+            <a:spLocks noChangeAspect="1" noChangeArrowheads="1"/>
+          </p:cNvSpPr>
+          <p:nvPr/>
+        </p:nvSpPr>
+        <p:spPr bwMode="auto">
+          <a:xfrm>
+            <a:off x="307975" y="7937"/>
+            <a:ext cx="304800" cy="304801"/>
+          </a:xfrm>
+          <a:prstGeom prst="rect">
+            <a:avLst/>
+          </a:prstGeom>
+          <a:noFill/>
+          <a:extLst>
+            <a:ext uri="{909E8E84-426E-40DD-AFC4-6F175D3DCCD1}">
+              <a14:hiddenFill xmlns:a14="http://schemas.microsoft.com/office/drawing/2010/main">
+                <a:solidFill>
+                  <a:srgbClr val="FFFFFF"/>
+                </a:solidFill>
+              </a14:hiddenFill>
+            </a:ext>
+          </a:extLst>
+        </p:spPr>
+        <p:txBody>
+          <a:bodyPr vert="horz" wrap="square" lIns="91440" tIns="45720" rIns="91440" bIns="45720" numCol="1" anchor="t" anchorCtr="0" compatLnSpc="1">
+            <a:prstTxWarp prst="textNoShape">
+              <a:avLst/>
+            </a:prstTxWarp>
+          </a:bodyPr>
+          <a:lstStyle/>
+          <a:p>
+            <a:endParaRPr lang="en-US"/>
+          </a:p>
+        </p:txBody>
+      </p:sp>
+      <p:pic>
+        <p:nvPicPr>
+          <p:cNvPr id="1031" name="Picture 7" descr="D:\college_assignments_and_projects\projects\Projects-and-Reports-College-\1216733.png"/>
+          <p:cNvPicPr>
+            <a:picLocks noChangeAspect="1" noChangeArrowheads="1"/>
+          </p:cNvPicPr>
+          <p:nvPr/>
+        </p:nvPicPr>
+        <p:blipFill>
+          <a:blip r:embed="rId2">
+            <a:extLst>
+              <a:ext uri="{28A0092B-C50C-407E-A947-70E740481C1C}">
+                <a14:useLocalDpi xmlns:a14="http://schemas.microsoft.com/office/drawing/2010/main" val="0"/>
+              </a:ext>
+            </a:extLst>
+          </a:blip>
+          <a:srcRect/>
+          <a:stretch>
+            <a:fillRect/>
+          </a:stretch>
+        </p:blipFill>
+        <p:spPr bwMode="auto">
+          <a:xfrm>
+            <a:off x="6321245" y="2577023"/>
+            <a:ext cx="1210146" cy="1210146"/>
+          </a:xfrm>
+          <a:prstGeom prst="roundRect">
+            <a:avLst>
+              <a:gd name="adj" fmla="val 8594"/>
+            </a:avLst>
+          </a:prstGeom>
+          <a:solidFill>
+            <a:srgbClr val="FFFFFF">
+              <a:shade val="85000"/>
+            </a:srgbClr>
+          </a:solidFill>
+          <a:ln>
+            <a:noFill/>
+          </a:ln>
+          <a:effectLst>
+            <a:reflection blurRad="12700" stA="38000" endPos="28000" dist="5000" dir="5400000" sy="-100000" algn="bl" rotWithShape="0"/>
+          </a:effectLst>
+          <a:extLst/>
+        </p:spPr>
+      </p:pic>
+      <p:pic>
+        <p:nvPicPr>
+          <p:cNvPr id="1032" name="Picture 8" descr="D:\college_assignments_and_projects\projects\Projects-and-Reports-College-\Git_icon.svg.png"/>
+          <p:cNvPicPr>
+            <a:picLocks noChangeAspect="1" noChangeArrowheads="1"/>
+          </p:cNvPicPr>
+          <p:nvPr/>
+        </p:nvPicPr>
+        <p:blipFill>
+          <a:blip r:embed="rId3">
+            <a:extLst>
+              <a:ext uri="{28A0092B-C50C-407E-A947-70E740481C1C}">
+                <a14:useLocalDpi xmlns:a14="http://schemas.microsoft.com/office/drawing/2010/main" val="0"/>
+              </a:ext>
+            </a:extLst>
+          </a:blip>
+          <a:srcRect/>
+          <a:stretch>
+            <a:fillRect/>
+          </a:stretch>
+        </p:blipFill>
+        <p:spPr bwMode="auto">
+          <a:xfrm>
+            <a:off x="6323242" y="4442648"/>
+            <a:ext cx="1323205" cy="1323205"/>
+          </a:xfrm>
+          <a:prstGeom prst="roundRect">
+            <a:avLst>
+              <a:gd name="adj" fmla="val 8594"/>
+            </a:avLst>
+          </a:prstGeom>
+          <a:solidFill>
+            <a:srgbClr val="FFFFFF">
+              <a:shade val="85000"/>
+            </a:srgbClr>
+          </a:solidFill>
+          <a:ln>
+            <a:noFill/>
+          </a:ln>
+          <a:effectLst>
+            <a:reflection blurRad="12700" stA="38000" endPos="28000" dist="5000" dir="5400000" sy="-100000" algn="bl" rotWithShape="0"/>
+          </a:effectLst>
+          <a:extLst/>
+        </p:spPr>
+      </p:pic>
+      <p:pic>
+        <p:nvPicPr>
+          <p:cNvPr id="1033" name="Picture 9" descr="D:\college_assignments_and_projects\projects\Projects-and-Reports-College-\javascript.png"/>
+          <p:cNvPicPr>
+            <a:picLocks noChangeAspect="1" noChangeArrowheads="1"/>
+          </p:cNvPicPr>
+          <p:nvPr/>
+        </p:nvPicPr>
+        <p:blipFill>
+          <a:blip r:embed="rId4">
+            <a:extLst>
+              <a:ext uri="{28A0092B-C50C-407E-A947-70E740481C1C}">
+                <a14:useLocalDpi xmlns:a14="http://schemas.microsoft.com/office/drawing/2010/main" val="0"/>
+              </a:ext>
+            </a:extLst>
+          </a:blip>
+          <a:srcRect/>
+          <a:stretch>
+            <a:fillRect/>
+          </a:stretch>
+        </p:blipFill>
+        <p:spPr bwMode="auto">
+          <a:xfrm>
+            <a:off x="8224933" y="4442648"/>
+            <a:ext cx="1215434" cy="1215434"/>
+          </a:xfrm>
+          <a:prstGeom prst="roundRect">
+            <a:avLst>
+              <a:gd name="adj" fmla="val 8594"/>
+            </a:avLst>
+          </a:prstGeom>
+          <a:solidFill>
+            <a:srgbClr val="FFFFFF">
+              <a:shade val="85000"/>
+            </a:srgbClr>
+          </a:solidFill>
+          <a:ln>
+            <a:noFill/>
+          </a:ln>
+          <a:effectLst>
+            <a:reflection blurRad="12700" stA="38000" endPos="28000" dist="5000" dir="5400000" sy="-100000" algn="bl" rotWithShape="0"/>
+          </a:effectLst>
+          <a:extLst/>
+        </p:spPr>
+      </p:pic>
+      <p:pic>
+        <p:nvPicPr>
+          <p:cNvPr id="1034" name="Picture 10" descr="D:\college_assignments_and_projects\projects\Projects-and-Reports-College-\25231.png"/>
+          <p:cNvPicPr>
+            <a:picLocks noChangeAspect="1" noChangeArrowheads="1"/>
+          </p:cNvPicPr>
+          <p:nvPr/>
+        </p:nvPicPr>
+        <p:blipFill>
+          <a:blip r:embed="rId5">
+            <a:extLst>
+              <a:ext uri="{28A0092B-C50C-407E-A947-70E740481C1C}">
+                <a14:useLocalDpi xmlns:a14="http://schemas.microsoft.com/office/drawing/2010/main" val="0"/>
+              </a:ext>
+            </a:extLst>
+          </a:blip>
+          <a:srcRect/>
+          <a:stretch>
+            <a:fillRect/>
+          </a:stretch>
+        </p:blipFill>
+        <p:spPr bwMode="auto">
+          <a:xfrm>
+            <a:off x="8275635" y="2577023"/>
+            <a:ext cx="1114029" cy="1114029"/>
+          </a:xfrm>
+          <a:prstGeom prst="roundRect">
+            <a:avLst>
+              <a:gd name="adj" fmla="val 8594"/>
+            </a:avLst>
+          </a:prstGeom>
+          <a:solidFill>
+            <a:srgbClr val="FFFFFF">
+              <a:shade val="85000"/>
+            </a:srgbClr>
+          </a:solidFill>
+          <a:ln>
+            <a:noFill/>
+          </a:ln>
+          <a:effectLst>
+            <a:reflection blurRad="12700" stA="38000" endPos="28000" dist="5000" dir="5400000" sy="-100000" algn="bl" rotWithShape="0"/>
+          </a:effectLst>
+          <a:extLst/>
+        </p:spPr>
+      </p:pic>
+      <p:pic>
+        <p:nvPicPr>
+          <p:cNvPr id="1036" name="Picture 12" descr="D:\college_assignments_and_projects\projects\Projects-and-Reports-College-\css.png"/>
+          <p:cNvPicPr>
+            <a:picLocks noChangeAspect="1" noChangeArrowheads="1"/>
+          </p:cNvPicPr>
+          <p:nvPr/>
+        </p:nvPicPr>
+        <p:blipFill>
+          <a:blip r:embed="rId6">
+            <a:extLst>
+              <a:ext uri="{28A0092B-C50C-407E-A947-70E740481C1C}">
+                <a14:useLocalDpi xmlns:a14="http://schemas.microsoft.com/office/drawing/2010/main" val="0"/>
+              </a:ext>
+            </a:extLst>
+          </a:blip>
+          <a:srcRect/>
+          <a:stretch>
+            <a:fillRect/>
+          </a:stretch>
+        </p:blipFill>
+        <p:spPr bwMode="auto">
+          <a:xfrm>
+            <a:off x="9943085" y="4377582"/>
+            <a:ext cx="1345566" cy="1345566"/>
+          </a:xfrm>
+          <a:prstGeom prst="roundRect">
+            <a:avLst>
+              <a:gd name="adj" fmla="val 8594"/>
+            </a:avLst>
+          </a:prstGeom>
+          <a:solidFill>
+            <a:srgbClr val="FFFFFF">
+              <a:shade val="85000"/>
+            </a:srgbClr>
+          </a:solidFill>
+          <a:ln>
+            <a:noFill/>
+          </a:ln>
+          <a:effectLst>
+            <a:reflection blurRad="12700" stA="38000" endPos="28000" dist="5000" dir="5400000" sy="-100000" algn="bl" rotWithShape="0"/>
+          </a:effectLst>
+          <a:extLst/>
+        </p:spPr>
+      </p:pic>
+      <p:pic>
+        <p:nvPicPr>
+          <p:cNvPr id="1039" name="Picture 15" descr="D:\college_assignments_and_projects\projects\Projects-and-Reports-College-\firebase.png"/>
+          <p:cNvPicPr>
+            <a:picLocks noChangeAspect="1" noChangeArrowheads="1"/>
+          </p:cNvPicPr>
+          <p:nvPr/>
+        </p:nvPicPr>
+        <p:blipFill>
+          <a:blip r:embed="rId7">
+            <a:extLst>
+              <a:ext uri="{28A0092B-C50C-407E-A947-70E740481C1C}">
+                <a14:useLocalDpi xmlns:a14="http://schemas.microsoft.com/office/drawing/2010/main" val="0"/>
+              </a:ext>
+            </a:extLst>
+          </a:blip>
+          <a:srcRect/>
+          <a:stretch>
+            <a:fillRect/>
+          </a:stretch>
+        </p:blipFill>
+        <p:spPr bwMode="auto">
+          <a:xfrm>
+            <a:off x="10024621" y="2593493"/>
+            <a:ext cx="1081088" cy="1081088"/>
+          </a:xfrm>
+          <a:prstGeom prst="roundRect">
+            <a:avLst>
+              <a:gd name="adj" fmla="val 8594"/>
+            </a:avLst>
+          </a:prstGeom>
+          <a:solidFill>
+            <a:srgbClr val="FFFFFF">
+              <a:shade val="85000"/>
+            </a:srgbClr>
+          </a:solidFill>
+          <a:ln>
+            <a:noFill/>
+          </a:ln>
+          <a:effectLst>
+            <a:reflection blurRad="12700" stA="38000" endPos="28000" dist="5000" dir="5400000" sy="-100000" algn="bl" rotWithShape="0"/>
+          </a:effectLst>
+          <a:extLst/>
+        </p:spPr>
+      </p:pic>
     </p:spTree>
     <p:extLst>
       <p:ext uri="{BB962C8B-B14F-4D97-AF65-F5344CB8AC3E}">
@@ -10106,7 +10861,7 @@
           <p:cNvPr id="2" name="Title 1">
             <a:extLst>
               <a:ext uri="{FF2B5EF4-FFF2-40B4-BE49-F238E27FC236}">
-                <a16:creationId xmlns:a16="http://schemas.microsoft.com/office/drawing/2014/main" id="{5E562972-3449-42D1-8185-B4BEFD52AB44}"/>
+                <a16:creationId xmlns="" xmlns:a16="http://schemas.microsoft.com/office/drawing/2014/main" id="{5E562972-3449-42D1-8185-B4BEFD52AB44}"/>
               </a:ext>
             </a:extLst>
           </p:cNvPr>
@@ -10139,7 +10894,7 @@
           <p:cNvPr id="8" name="Content Placeholder 7">
             <a:extLst>
               <a:ext uri="{FF2B5EF4-FFF2-40B4-BE49-F238E27FC236}">
-                <a16:creationId xmlns:a16="http://schemas.microsoft.com/office/drawing/2014/main" id="{256A640F-0DE8-43AE-9A44-74B302AB9BE7}"/>
+                <a16:creationId xmlns="" xmlns:a16="http://schemas.microsoft.com/office/drawing/2014/main" id="{256A640F-0DE8-43AE-9A44-74B302AB9BE7}"/>
               </a:ext>
             </a:extLst>
           </p:cNvPr>
@@ -10152,8 +10907,8 @@
         </p:nvSpPr>
         <p:spPr>
           <a:xfrm>
-            <a:off x="913795" y="1326321"/>
-            <a:ext cx="6372830" cy="4464879"/>
+            <a:off x="913794" y="1293224"/>
+            <a:ext cx="9484239" cy="1867988"/>
           </a:xfrm>
         </p:spPr>
         <p:txBody>
@@ -10193,7 +10948,7 @@
           <p:cNvPr id="3" name="Picture 2">
             <a:extLst>
               <a:ext uri="{FF2B5EF4-FFF2-40B4-BE49-F238E27FC236}">
-                <a16:creationId xmlns:a16="http://schemas.microsoft.com/office/drawing/2014/main" id="{D3E9175D-36E2-4ECC-8D93-304B0ED8FC52}"/>
+                <a16:creationId xmlns="" xmlns:a16="http://schemas.microsoft.com/office/drawing/2014/main" id="{D3E9175D-36E2-4ECC-8D93-304B0ED8FC52}"/>
               </a:ext>
             </a:extLst>
           </p:cNvPr>
@@ -10210,12 +10965,76 @@
         </p:blipFill>
         <p:spPr>
           <a:xfrm>
-            <a:off x="7553324" y="1226321"/>
-            <a:ext cx="4333875" cy="2869886"/>
+            <a:off x="6968475" y="3268725"/>
+            <a:ext cx="4918725" cy="3257173"/>
           </a:xfrm>
           <a:prstGeom prst="rect">
             <a:avLst/>
           </a:prstGeom>
+        </p:spPr>
+      </p:pic>
+      <p:pic>
+        <p:nvPicPr>
+          <p:cNvPr id="2050" name="Picture 2"/>
+          <p:cNvPicPr>
+            <a:picLocks noChangeAspect="1" noChangeArrowheads="1"/>
+          </p:cNvPicPr>
+          <p:nvPr/>
+        </p:nvPicPr>
+        <p:blipFill>
+          <a:blip r:embed="rId3">
+            <a:extLst>
+              <a:ext uri="{28A0092B-C50C-407E-A947-70E740481C1C}">
+                <a14:useLocalDpi xmlns:a14="http://schemas.microsoft.com/office/drawing/2010/main" val="0"/>
+              </a:ext>
+            </a:extLst>
+          </a:blip>
+          <a:srcRect/>
+          <a:stretch>
+            <a:fillRect/>
+          </a:stretch>
+        </p:blipFill>
+        <p:spPr bwMode="auto">
+          <a:xfrm>
+            <a:off x="554764" y="3370217"/>
+            <a:ext cx="6105137" cy="2515511"/>
+          </a:xfrm>
+          <a:prstGeom prst="rect">
+            <a:avLst/>
+          </a:prstGeom>
+          <a:noFill/>
+          <a:ln>
+            <a:noFill/>
+          </a:ln>
+          <a:effectLst/>
+          <a:extLst>
+            <a:ext uri="{909E8E84-426E-40DD-AFC4-6F175D3DCCD1}">
+              <a14:hiddenFill xmlns:a14="http://schemas.microsoft.com/office/drawing/2010/main">
+                <a:solidFill>
+                  <a:schemeClr val="accent1"/>
+                </a:solidFill>
+              </a14:hiddenFill>
+            </a:ext>
+            <a:ext uri="{91240B29-F687-4F45-9708-019B960494DF}">
+              <a14:hiddenLine xmlns:a14="http://schemas.microsoft.com/office/drawing/2010/main" w="9525">
+                <a:solidFill>
+                  <a:schemeClr val="tx1"/>
+                </a:solidFill>
+                <a:miter lim="800000"/>
+                <a:headEnd/>
+                <a:tailEnd/>
+              </a14:hiddenLine>
+            </a:ext>
+            <a:ext uri="{AF507438-7753-43E0-B8FC-AC1667EBCBE1}">
+              <a14:hiddenEffects xmlns:a14="http://schemas.microsoft.com/office/drawing/2010/main">
+                <a:effectLst>
+                  <a:outerShdw dist="35921" dir="2700000" algn="ctr" rotWithShape="0">
+                    <a:schemeClr val="bg2"/>
+                  </a:outerShdw>
+                </a:effectLst>
+              </a14:hiddenEffects>
+            </a:ext>
+          </a:extLst>
         </p:spPr>
       </p:pic>
     </p:spTree>
@@ -10253,7 +11072,7 @@
           <p:cNvPr id="2" name="Title 1">
             <a:extLst>
               <a:ext uri="{FF2B5EF4-FFF2-40B4-BE49-F238E27FC236}">
-                <a16:creationId xmlns:a16="http://schemas.microsoft.com/office/drawing/2014/main" id="{5E562972-3449-42D1-8185-B4BEFD52AB44}"/>
+                <a16:creationId xmlns="" xmlns:a16="http://schemas.microsoft.com/office/drawing/2014/main" id="{5E562972-3449-42D1-8185-B4BEFD52AB44}"/>
               </a:ext>
             </a:extLst>
           </p:cNvPr>
@@ -10286,7 +11105,7 @@
           <p:cNvPr id="8" name="Content Placeholder 7">
             <a:extLst>
               <a:ext uri="{FF2B5EF4-FFF2-40B4-BE49-F238E27FC236}">
-                <a16:creationId xmlns:a16="http://schemas.microsoft.com/office/drawing/2014/main" id="{256A640F-0DE8-43AE-9A44-74B302AB9BE7}"/>
+                <a16:creationId xmlns="" xmlns:a16="http://schemas.microsoft.com/office/drawing/2014/main" id="{256A640F-0DE8-43AE-9A44-74B302AB9BE7}"/>
               </a:ext>
             </a:extLst>
           </p:cNvPr>
@@ -10373,7 +11192,7 @@
           <p:cNvPr id="2" name="Title 1">
             <a:extLst>
               <a:ext uri="{FF2B5EF4-FFF2-40B4-BE49-F238E27FC236}">
-                <a16:creationId xmlns:a16="http://schemas.microsoft.com/office/drawing/2014/main" id="{5E562972-3449-42D1-8185-B4BEFD52AB44}"/>
+                <a16:creationId xmlns="" xmlns:a16="http://schemas.microsoft.com/office/drawing/2014/main" id="{5E562972-3449-42D1-8185-B4BEFD52AB44}"/>
               </a:ext>
             </a:extLst>
           </p:cNvPr>
@@ -10406,7 +11225,7 @@
           <p:cNvPr id="8" name="Content Placeholder 7">
             <a:extLst>
               <a:ext uri="{FF2B5EF4-FFF2-40B4-BE49-F238E27FC236}">
-                <a16:creationId xmlns:a16="http://schemas.microsoft.com/office/drawing/2014/main" id="{256A640F-0DE8-43AE-9A44-74B302AB9BE7}"/>
+                <a16:creationId xmlns="" xmlns:a16="http://schemas.microsoft.com/office/drawing/2014/main" id="{256A640F-0DE8-43AE-9A44-74B302AB9BE7}"/>
               </a:ext>
             </a:extLst>
           </p:cNvPr>
@@ -10594,7 +11413,7 @@
     </a:clrScheme>
     <a:fontScheme name="Damask">
       <a:majorFont>
-        <a:latin typeface="Bookman Old Style" panose="02050604050505020204"/>
+        <a:latin typeface="Bookman Old Style"/>
         <a:ea typeface=""/>
         <a:cs typeface=""/>
         <a:font script="Jpan" typeface="ＭＳ Ｐゴシック"/>
@@ -10629,7 +11448,7 @@
         <a:font script="Geor" typeface="Sylfaen"/>
       </a:majorFont>
       <a:minorFont>
-        <a:latin typeface="Rockwell" panose="02060603020205020403"/>
+        <a:latin typeface="Rockwell"/>
         <a:ea typeface=""/>
         <a:cs typeface=""/>
         <a:font script="Jpan" typeface="ＭＳ Ｐゴシック"/>
@@ -10801,7 +11620,7 @@
   <a:extraClrSchemeLst/>
   <a:extLst>
     <a:ext uri="{05A4C25C-085E-4340-85A3-A5531E510DB2}">
-      <thm15:themeFamily xmlns:thm15="http://schemas.microsoft.com/office/thememl/2012/main" name="Damask" id="{F9A299A0-33D0-4E0F-9F3F-7163E3744208}" vid="{746EEEEA-FB6A-406B-B510-531588D54811}"/>
+      <thm15:themeFamily xmlns="" xmlns:thm15="http://schemas.microsoft.com/office/thememl/2012/main" name="Damask" id="{F9A299A0-33D0-4E0F-9F3F-7163E3744208}" vid="{746EEEEA-FB6A-406B-B510-531588D54811}"/>
     </a:ext>
   </a:extLst>
 </a:theme>

</xml_diff>